<commit_message>
update file github pycharm
</commit_message>
<xml_diff>
--- a/pycharm-github.pptx
+++ b/pycharm-github.pptx
@@ -7,8 +7,9 @@
   </p:sldMasterIdLst>
   <p:sldIdLst>
     <p:sldId id="256" r:id="rId3"/>
-    <p:sldId id="257" r:id="rId4"/>
-    <p:sldId id="258" r:id="rId5"/>
+    <p:sldId id="259" r:id="rId4"/>
+    <p:sldId id="257" r:id="rId5"/>
+    <p:sldId id="258" r:id="rId6"/>
   </p:sldIdLst>
   <p:sldSz cx="10080625" cy="5670550"/>
   <p:notesSz cx="7559675" cy="10691813"/>
@@ -11585,11 +11586,20 @@
               <a:buNone/>
             </a:pPr>
             <a:r>
-              <a:rPr lang="pl-PL" sz="3300" b="0" strike="noStrike" spc="-1">
+              <a:rPr lang="pl-PL" sz="3300" b="0" strike="noStrike" spc="-1" dirty="0">
                 <a:latin typeface="Arial"/>
               </a:rPr>
-              <a:t>Konfiguracja GitHub w PyCharm</a:t>
+              <a:t>Konfiguracja GitHub w </a:t>
             </a:r>
+            <a:r>
+              <a:rPr lang="pl-PL" sz="3300" b="0" strike="noStrike" spc="-1" dirty="0" err="1">
+                <a:latin typeface="Arial"/>
+              </a:rPr>
+              <a:t>PyCharm</a:t>
+            </a:r>
+            <a:endParaRPr lang="pl-PL" sz="3300" b="0" strike="noStrike" spc="-1" dirty="0">
+              <a:latin typeface="Arial"/>
+            </a:endParaRPr>
           </a:p>
         </p:txBody>
       </p:sp>
@@ -11625,7 +11635,7 @@
             <a:pPr algn="ctr">
               <a:buNone/>
             </a:pPr>
-            <a:endParaRPr lang="pl-PL" sz="3200" b="0" strike="noStrike" spc="-1">
+            <a:endParaRPr lang="pl-PL" sz="3200" b="0" strike="noStrike" spc="-1" dirty="0">
               <a:latin typeface="Arial"/>
             </a:endParaRPr>
           </a:p>
@@ -11668,8 +11678,8 @@
         </p:nvSpPr>
         <p:spPr>
           <a:xfrm>
-            <a:off x="540000" y="180000"/>
-            <a:ext cx="9000000" cy="900000"/>
+            <a:off x="540000" y="179999"/>
+            <a:ext cx="9000000" cy="3979625"/>
           </a:xfrm>
           <a:prstGeom prst="rect">
             <a:avLst/>
@@ -11689,53 +11699,108 @@
               <a:buNone/>
             </a:pPr>
             <a:r>
-              <a:rPr lang="pl-PL" sz="3300" b="0" strike="noStrike" spc="-1">
+              <a:rPr lang="pl-PL" sz="3300" spc="-1" dirty="0">
                 <a:latin typeface="Arial"/>
               </a:rPr>
-              <a:t>Film</a:t>
+              <a:t>Instalacja gita</a:t>
             </a:r>
+            <a:br>
+              <a:rPr lang="pl-PL" sz="3300" spc="-1" dirty="0">
+                <a:latin typeface="Arial"/>
+              </a:rPr>
+            </a:br>
+            <a:r>
+              <a:rPr lang="pl-PL" sz="3300" spc="-1" dirty="0">
+                <a:latin typeface="Arial"/>
+              </a:rPr>
+              <a:t>link do pobrania gita:</a:t>
+            </a:r>
+            <a:br>
+              <a:rPr lang="pl-PL" sz="3300" spc="-1" dirty="0">
+                <a:latin typeface="Arial"/>
+              </a:rPr>
+            </a:br>
+            <a:r>
+              <a:rPr lang="pl-PL" sz="3300" spc="-1" dirty="0">
+                <a:latin typeface="Arial"/>
+              </a:rPr>
+              <a:t>https://git-scm.com/downloads</a:t>
+            </a:r>
+            <a:br>
+              <a:rPr lang="pl-PL" sz="3300" spc="-1" dirty="0">
+                <a:latin typeface="Arial"/>
+              </a:rPr>
+            </a:br>
+            <a:r>
+              <a:rPr lang="pl-PL" sz="3300" spc="-1" dirty="0">
+                <a:latin typeface="Arial"/>
+              </a:rPr>
+              <a:t>Po pobraniu i zainstalowaniu należy w terminalu wydać komendę:</a:t>
+            </a:r>
+            <a:br>
+              <a:rPr lang="pl-PL" sz="3300" spc="-1" dirty="0">
+                <a:latin typeface="Arial"/>
+              </a:rPr>
+            </a:br>
+            <a:r>
+              <a:rPr lang="pl-PL" sz="3300" b="1" spc="-1" dirty="0">
+                <a:latin typeface="Arial"/>
+              </a:rPr>
+              <a:t>git </a:t>
+            </a:r>
+            <a:r>
+              <a:rPr lang="pl-PL" sz="3300" b="1" spc="-1" dirty="0" err="1">
+                <a:latin typeface="Arial"/>
+              </a:rPr>
+              <a:t>init</a:t>
+            </a:r>
+            <a:br>
+              <a:rPr lang="pl-PL" sz="3300" spc="-1" dirty="0">
+                <a:latin typeface="Arial"/>
+              </a:rPr>
+            </a:br>
+            <a:r>
+              <a:rPr lang="pl-PL" sz="3300" spc="-1" dirty="0">
+                <a:latin typeface="Arial"/>
+              </a:rPr>
+              <a:t>Następnie skonfigurować konto </a:t>
+            </a:r>
+            <a:r>
+              <a:rPr lang="pl-PL" sz="3300" spc="-1" dirty="0" err="1">
+                <a:latin typeface="Arial"/>
+              </a:rPr>
+              <a:t>github</a:t>
+            </a:r>
+            <a:r>
+              <a:rPr lang="pl-PL" sz="3300" spc="-1" dirty="0">
+                <a:latin typeface="Arial"/>
+              </a:rPr>
+              <a:t> w </a:t>
+            </a:r>
+            <a:r>
+              <a:rPr lang="pl-PL" sz="3300" spc="-1" dirty="0" err="1">
+                <a:latin typeface="Arial"/>
+              </a:rPr>
+              <a:t>Pycharm</a:t>
+            </a:r>
+            <a:r>
+              <a:rPr lang="pl-PL" sz="3300" spc="-1" dirty="0">
+                <a:latin typeface="Arial"/>
+              </a:rPr>
+              <a:t> i kolejne kroki</a:t>
+            </a:r>
+            <a:endParaRPr lang="pl-PL" sz="3300" b="0" strike="noStrike" spc="-1" dirty="0">
+              <a:latin typeface="Arial"/>
+            </a:endParaRPr>
           </a:p>
         </p:txBody>
       </p:sp>
-      <p:sp>
-        <p:nvSpPr>
-          <p:cNvPr id="3" name="pole tekstowe 2">
-            <a:extLst>
-              <a:ext uri="{FF2B5EF4-FFF2-40B4-BE49-F238E27FC236}">
-                <a16:creationId xmlns:a16="http://schemas.microsoft.com/office/drawing/2014/main" id="{DF6A8706-129B-3897-F4D4-D2356EF693CA}"/>
-              </a:ext>
-            </a:extLst>
-          </p:cNvPr>
-          <p:cNvSpPr txBox="1"/>
-          <p:nvPr/>
-        </p:nvSpPr>
-        <p:spPr>
-          <a:xfrm>
-            <a:off x="2344918" y="2764113"/>
-            <a:ext cx="5443978" cy="646331"/>
-          </a:xfrm>
-          <a:prstGeom prst="rect">
-            <a:avLst/>
-          </a:prstGeom>
-          <a:noFill/>
-        </p:spPr>
-        <p:txBody>
-          <a:bodyPr wrap="square">
-            <a:spAutoFit/>
-          </a:bodyPr>
-          <a:lstStyle/>
-          <a:p>
-            <a:r>
-              <a:rPr lang="pl-PL" dirty="0">
-                <a:hlinkClick r:id="rId2"/>
-              </a:rPr>
-              <a:t>https://drive.google.com/file/d/19USLUIuSvcYKpZIXI0yfl_Pst-jGvD_u/view?usp=drive_link</a:t>
-            </a:r>
-            <a:endParaRPr lang="pl-PL" dirty="0"/>
-          </a:p>
-        </p:txBody>
-      </p:sp>
     </p:spTree>
+    <p:extLst>
+      <p:ext uri="{BB962C8B-B14F-4D97-AF65-F5344CB8AC3E}">
+        <p14:creationId xmlns:p14="http://schemas.microsoft.com/office/powerpoint/2010/main" val="3104972071"/>
+      </p:ext>
+    </p:extLst>
   </p:cSld>
   <p:clrMapOvr>
     <a:masterClrMapping/>
@@ -11762,6 +11827,110 @@
       </p:grpSpPr>
       <p:sp>
         <p:nvSpPr>
+          <p:cNvPr id="188" name="PlaceHolder 1"/>
+          <p:cNvSpPr>
+            <a:spLocks noGrp="1"/>
+          </p:cNvSpPr>
+          <p:nvPr>
+            <p:ph type="title"/>
+          </p:nvPr>
+        </p:nvSpPr>
+        <p:spPr>
+          <a:xfrm>
+            <a:off x="540000" y="180000"/>
+            <a:ext cx="9000000" cy="900000"/>
+          </a:xfrm>
+          <a:prstGeom prst="rect">
+            <a:avLst/>
+          </a:prstGeom>
+          <a:noFill/>
+          <a:ln w="0">
+            <a:noFill/>
+          </a:ln>
+        </p:spPr>
+        <p:txBody>
+          <a:bodyPr lIns="0" tIns="0" rIns="0" bIns="0" anchor="ctr">
+            <a:noAutofit/>
+          </a:bodyPr>
+          <a:lstStyle/>
+          <a:p>
+            <a:pPr algn="ctr">
+              <a:buNone/>
+            </a:pPr>
+            <a:r>
+              <a:rPr lang="pl-PL" sz="3300" b="0" strike="noStrike" spc="-1">
+                <a:latin typeface="Arial"/>
+              </a:rPr>
+              <a:t>Film</a:t>
+            </a:r>
+          </a:p>
+        </p:txBody>
+      </p:sp>
+      <p:sp>
+        <p:nvSpPr>
+          <p:cNvPr id="3" name="pole tekstowe 2">
+            <a:extLst>
+              <a:ext uri="{FF2B5EF4-FFF2-40B4-BE49-F238E27FC236}">
+                <a16:creationId xmlns:a16="http://schemas.microsoft.com/office/drawing/2014/main" id="{DF6A8706-129B-3897-F4D4-D2356EF693CA}"/>
+              </a:ext>
+            </a:extLst>
+          </p:cNvPr>
+          <p:cNvSpPr txBox="1"/>
+          <p:nvPr/>
+        </p:nvSpPr>
+        <p:spPr>
+          <a:xfrm>
+            <a:off x="2344918" y="2764113"/>
+            <a:ext cx="5443978" cy="646331"/>
+          </a:xfrm>
+          <a:prstGeom prst="rect">
+            <a:avLst/>
+          </a:prstGeom>
+          <a:noFill/>
+        </p:spPr>
+        <p:txBody>
+          <a:bodyPr wrap="square">
+            <a:spAutoFit/>
+          </a:bodyPr>
+          <a:lstStyle/>
+          <a:p>
+            <a:r>
+              <a:rPr lang="pl-PL" dirty="0">
+                <a:hlinkClick r:id="rId2"/>
+              </a:rPr>
+              <a:t>https://drive.google.com/file/d/19USLUIuSvcYKpZIXI0yfl_Pst-jGvD_u/view?usp=drive_link</a:t>
+            </a:r>
+            <a:endParaRPr lang="pl-PL" dirty="0"/>
+          </a:p>
+        </p:txBody>
+      </p:sp>
+    </p:spTree>
+  </p:cSld>
+  <p:clrMapOvr>
+    <a:masterClrMapping/>
+  </p:clrMapOvr>
+</p:sld>
+</file>
+
+<file path=ppt/slides/slide4.xml><?xml version="1.0" encoding="utf-8"?>
+<p:sld xmlns:a="http://schemas.openxmlformats.org/drawingml/2006/main" xmlns:r="http://schemas.openxmlformats.org/officeDocument/2006/relationships" xmlns:p="http://schemas.openxmlformats.org/presentationml/2006/main">
+  <p:cSld>
+    <p:spTree>
+      <p:nvGrpSpPr>
+        <p:cNvPr id="1" name=""/>
+        <p:cNvGrpSpPr/>
+        <p:nvPr/>
+      </p:nvGrpSpPr>
+      <p:grpSpPr>
+        <a:xfrm>
+          <a:off x="0" y="0"/>
+          <a:ext cx="0" cy="0"/>
+          <a:chOff x="0" y="0"/>
+          <a:chExt cx="0" cy="0"/>
+        </a:xfrm>
+      </p:grpSpPr>
+      <p:sp>
+        <p:nvSpPr>
           <p:cNvPr id="190" name="PlaceHolder 1"/>
           <p:cNvSpPr>
             <a:spLocks noGrp="1"/>
@@ -11829,6 +11998,62 @@
             <a:normAutofit/>
           </a:bodyPr>
           <a:lstStyle/>
+          <a:p>
+            <a:pPr marL="432000" indent="-324000">
+              <a:spcAft>
+                <a:spcPts val="1060"/>
+              </a:spcAft>
+              <a:buClr>
+                <a:srgbClr val="000000"/>
+              </a:buClr>
+              <a:buSzPct val="45000"/>
+              <a:buFont typeface="Wingdings" charset="2"/>
+              <a:buChar char=""/>
+            </a:pPr>
+            <a:r>
+              <a:rPr lang="pl-PL" sz="2400" b="0" strike="noStrike" spc="-1" dirty="0">
+                <a:latin typeface="Arial"/>
+              </a:rPr>
+              <a:t>Po konfiguracji należy ustawić dane użytkownika by popranie można było </a:t>
+            </a:r>
+            <a:r>
+              <a:rPr lang="pl-PL" sz="2400" b="0" strike="noStrike" spc="-1" dirty="0" err="1">
+                <a:latin typeface="Arial"/>
+              </a:rPr>
+              <a:t>wysyłąć</a:t>
+            </a:r>
+            <a:r>
+              <a:rPr lang="pl-PL" sz="2400" b="0" strike="noStrike" spc="-1" dirty="0">
+                <a:latin typeface="Arial"/>
+              </a:rPr>
+              <a:t> kod programu na </a:t>
+            </a:r>
+            <a:r>
+              <a:rPr lang="pl-PL" sz="2400" b="0" strike="noStrike" spc="-1" dirty="0" err="1">
+                <a:latin typeface="Arial"/>
+              </a:rPr>
+              <a:t>githuba</a:t>
+            </a:r>
+            <a:endParaRPr lang="pl-PL" sz="2400" b="0" strike="noStrike" spc="-1" dirty="0">
+              <a:latin typeface="Arial"/>
+            </a:endParaRPr>
+          </a:p>
+          <a:p>
+            <a:pPr marL="432000" indent="-324000">
+              <a:spcAft>
+                <a:spcPts val="1060"/>
+              </a:spcAft>
+              <a:buClr>
+                <a:srgbClr val="000000"/>
+              </a:buClr>
+              <a:buSzPct val="45000"/>
+              <a:buFont typeface="Wingdings" charset="2"/>
+              <a:buChar char=""/>
+            </a:pPr>
+            <a:endParaRPr lang="pl-PL" sz="2400" b="0" strike="noStrike" spc="-1" dirty="0">
+              <a:latin typeface="Arial"/>
+            </a:endParaRPr>
+          </a:p>
           <a:p>
             <a:pPr marL="432000" indent="-324000">
               <a:spcAft>
@@ -11906,13 +12131,13 @@
               <a:rPr lang="pl-PL" sz="2400" b="0" strike="noStrike" spc="-1" dirty="0" err="1">
                 <a:latin typeface="Arial"/>
               </a:rPr>
-              <a:t>globa</a:t>
+              <a:t>global</a:t>
             </a:r>
             <a:r>
               <a:rPr lang="pl-PL" sz="2400" b="0" strike="noStrike" spc="-1" dirty="0">
                 <a:latin typeface="Arial"/>
               </a:rPr>
-              <a:t> l </a:t>
+              <a:t> </a:t>
             </a:r>
             <a:r>
               <a:rPr lang="pl-PL" sz="2400" b="0" strike="noStrike" spc="-1" dirty="0" err="1">

</xml_diff>